<commit_message>
Started iteration two of optimisation
</commit_message>
<xml_diff>
--- a/OptmisationProcess.pptx
+++ b/OptmisationProcess.pptx
@@ -9,6 +9,8 @@
     <p:sldId id="256" r:id="rId3"/>
     <p:sldId id="258" r:id="rId4"/>
     <p:sldId id="259" r:id="rId5"/>
+    <p:sldId id="260" r:id="rId6"/>
+    <p:sldId id="261" r:id="rId7"/>
   </p:sldIdLst>
   <p:sldSz cx="12192000" cy="6858000"/>
   <p:notesSz cx="6858000" cy="9144000"/>
@@ -4630,6 +4632,16 @@
           <a:prstGeom prst="rect">
             <a:avLst/>
           </a:prstGeom>
+          <a:ln>
+            <a:noFill/>
+          </a:ln>
+          <a:effectLst>
+            <a:outerShdw blurRad="292100" dist="139700" dir="2700000" algn="tl" rotWithShape="0">
+              <a:srgbClr val="333333">
+                <a:alpha val="65000"/>
+              </a:srgbClr>
+            </a:outerShdw>
+          </a:effectLst>
         </p:spPr>
       </p:pic>
       <p:sp>
@@ -4667,12 +4679,53 @@
           </a:p>
         </p:txBody>
       </p:sp>
+      <p:sp>
+        <p:nvSpPr>
+          <p:cNvPr id="13" name="TextBox 12">
+            <a:extLst>
+              <a:ext uri="{FF2B5EF4-FFF2-40B4-BE49-F238E27FC236}">
+                <a16:creationId xmlns:a16="http://schemas.microsoft.com/office/drawing/2014/main" id="{D69CE289-B4D8-4C04-8991-9346F3EE1EA9}"/>
+              </a:ext>
+            </a:extLst>
+          </p:cNvPr>
+          <p:cNvSpPr txBox="1"/>
+          <p:nvPr/>
+        </p:nvSpPr>
+        <p:spPr>
+          <a:xfrm>
+            <a:off x="6020716" y="855896"/>
+            <a:ext cx="5136642" cy="707886"/>
+          </a:xfrm>
+          <a:prstGeom prst="rect">
+            <a:avLst/>
+          </a:prstGeom>
+          <a:noFill/>
+        </p:spPr>
+        <p:txBody>
+          <a:bodyPr wrap="square" rtlCol="0">
+            <a:spAutoFit/>
+          </a:bodyPr>
+          <a:lstStyle/>
+          <a:p>
+            <a:r>
+              <a:rPr lang="en-GB" sz="1000" dirty="0"/>
+              <a:t>To Solve this issue, I created a struct that contained the location of the sprite, the atlas index number and the layer.</a:t>
+            </a:r>
+          </a:p>
+          <a:p>
+            <a:r>
+              <a:rPr lang="en-GB" sz="1000" dirty="0"/>
+              <a:t>I also created a vector of all the textures, so that I could batch render all the textures at the end of the frame.</a:t>
+            </a:r>
+          </a:p>
+        </p:txBody>
+      </p:sp>
       <p:pic>
         <p:nvPicPr>
-          <p:cNvPr id="7" name="Picture 6">
-            <a:extLst>
-              <a:ext uri="{FF2B5EF4-FFF2-40B4-BE49-F238E27FC236}">
-                <a16:creationId xmlns:a16="http://schemas.microsoft.com/office/drawing/2014/main" id="{CA8855D4-F1AD-4F7A-9AC1-D1B41EC30100}"/>
+          <p:cNvPr id="15" name="Picture 14">
+            <a:extLst>
+              <a:ext uri="{FF2B5EF4-FFF2-40B4-BE49-F238E27FC236}">
+                <a16:creationId xmlns:a16="http://schemas.microsoft.com/office/drawing/2014/main" id="{C0DDF5E9-0AB8-40A0-B0DC-D00E9319FD22}"/>
               </a:ext>
             </a:extLst>
           </p:cNvPr>
@@ -4689,93 +4742,27 @@
               </a:ext>
             </a:extLst>
           </a:blip>
-          <a:srcRect l="1961" t="27056" r="79264" b="45234"/>
+          <a:srcRect l="4887" t="39680" r="67488" b="43530"/>
           <a:stretch/>
         </p:blipFill>
         <p:spPr>
           <a:xfrm>
-            <a:off x="6096000" y="1635605"/>
-            <a:ext cx="2289013" cy="1841384"/>
+            <a:off x="8883201" y="2676398"/>
+            <a:ext cx="2961340" cy="981030"/>
           </a:xfrm>
           <a:prstGeom prst="rect">
             <a:avLst/>
           </a:prstGeom>
-        </p:spPr>
-      </p:pic>
-      <p:sp>
-        <p:nvSpPr>
-          <p:cNvPr id="13" name="TextBox 12">
-            <a:extLst>
-              <a:ext uri="{FF2B5EF4-FFF2-40B4-BE49-F238E27FC236}">
-                <a16:creationId xmlns:a16="http://schemas.microsoft.com/office/drawing/2014/main" id="{D69CE289-B4D8-4C04-8991-9346F3EE1EA9}"/>
-              </a:ext>
-            </a:extLst>
-          </p:cNvPr>
-          <p:cNvSpPr txBox="1"/>
-          <p:nvPr/>
-        </p:nvSpPr>
-        <p:spPr>
-          <a:xfrm>
-            <a:off x="6020716" y="855896"/>
-            <a:ext cx="5136642" cy="707886"/>
-          </a:xfrm>
-          <a:prstGeom prst="rect">
-            <a:avLst/>
-          </a:prstGeom>
-          <a:noFill/>
-        </p:spPr>
-        <p:txBody>
-          <a:bodyPr wrap="square" rtlCol="0">
-            <a:spAutoFit/>
-          </a:bodyPr>
-          <a:lstStyle/>
-          <a:p>
-            <a:r>
-              <a:rPr lang="en-GB" sz="1000" dirty="0"/>
-              <a:t>To Solve this issue, I created a struct that simply contained the location of the sprite and the atlas index number.</a:t>
-            </a:r>
-          </a:p>
-          <a:p>
-            <a:r>
-              <a:rPr lang="en-GB" sz="1000" dirty="0"/>
-              <a:t>I also created a vector of all the textures, so that I could batch render all the textures at the end of the frame.</a:t>
-            </a:r>
-          </a:p>
-        </p:txBody>
-      </p:sp>
-      <p:pic>
-        <p:nvPicPr>
-          <p:cNvPr id="15" name="Picture 14">
-            <a:extLst>
-              <a:ext uri="{FF2B5EF4-FFF2-40B4-BE49-F238E27FC236}">
-                <a16:creationId xmlns:a16="http://schemas.microsoft.com/office/drawing/2014/main" id="{C0DDF5E9-0AB8-40A0-B0DC-D00E9319FD22}"/>
-              </a:ext>
-            </a:extLst>
-          </p:cNvPr>
-          <p:cNvPicPr>
-            <a:picLocks noChangeAspect="1"/>
-          </p:cNvPicPr>
-          <p:nvPr/>
-        </p:nvPicPr>
-        <p:blipFill rotWithShape="1">
-          <a:blip r:embed="rId4">
-            <a:extLst>
-              <a:ext uri="{28A0092B-C50C-407E-A947-70E740481C1C}">
-                <a14:useLocalDpi xmlns:a14="http://schemas.microsoft.com/office/drawing/2010/main" val="0"/>
-              </a:ext>
-            </a:extLst>
-          </a:blip>
-          <a:srcRect l="4887" t="39680" r="67488" b="43530"/>
-          <a:stretch/>
-        </p:blipFill>
-        <p:spPr>
-          <a:xfrm>
-            <a:off x="8412073" y="1635605"/>
-            <a:ext cx="3367964" cy="1115736"/>
-          </a:xfrm>
-          <a:prstGeom prst="rect">
-            <a:avLst/>
-          </a:prstGeom>
+          <a:ln>
+            <a:noFill/>
+          </a:ln>
+          <a:effectLst>
+            <a:outerShdw blurRad="292100" dist="139700" dir="2700000" algn="tl" rotWithShape="0">
+              <a:srgbClr val="333333">
+                <a:alpha val="65000"/>
+              </a:srgbClr>
+            </a:outerShdw>
+          </a:effectLst>
         </p:spPr>
       </p:pic>
       <p:cxnSp>
@@ -4816,10 +4803,10 @@
       </p:cxnSp>
       <p:sp>
         <p:nvSpPr>
-          <p:cNvPr id="18" name="TextBox 17">
-            <a:extLst>
-              <a:ext uri="{FF2B5EF4-FFF2-40B4-BE49-F238E27FC236}">
-                <a16:creationId xmlns:a16="http://schemas.microsoft.com/office/drawing/2014/main" id="{5337C0BE-FC52-4018-B013-9A3554731FF3}"/>
+          <p:cNvPr id="19" name="TextBox 18">
+            <a:extLst>
+              <a:ext uri="{FF2B5EF4-FFF2-40B4-BE49-F238E27FC236}">
+                <a16:creationId xmlns:a16="http://schemas.microsoft.com/office/drawing/2014/main" id="{464E3E14-4249-497E-9A4A-6384A32DE41A}"/>
               </a:ext>
             </a:extLst>
           </p:cNvPr>
@@ -4828,8 +4815,8 @@
         </p:nvSpPr>
         <p:spPr>
           <a:xfrm>
-            <a:off x="6130277" y="3752717"/>
-            <a:ext cx="5136642" cy="707886"/>
+            <a:off x="2832899" y="3947761"/>
+            <a:ext cx="2615751" cy="1477328"/>
           </a:xfrm>
           <a:prstGeom prst="rect">
             <a:avLst/>
@@ -4844,7 +4831,13 @@
           <a:p>
             <a:r>
               <a:rPr lang="en-GB" sz="1000" dirty="0"/>
-              <a:t>This means that now the game doesn’t create a new texture for each cell as the player explores the level.</a:t>
+              <a:t>This method also meant I had to do a few hacks to get the trees rendering properly.</a:t>
+            </a:r>
+          </a:p>
+          <a:p>
+            <a:r>
+              <a:rPr lang="en-GB" sz="1000" dirty="0"/>
+              <a:t>The image to the left shows I had two vectors, one that contained the trees that were to be rendered above the player, and another that was to be rendered below.</a:t>
             </a:r>
           </a:p>
           <a:p>
@@ -4853,17 +4846,17 @@
           <a:p>
             <a:r>
               <a:rPr lang="en-GB" sz="1000" dirty="0"/>
-              <a:t>                       NEW			               OLD</a:t>
+              <a:t>This could be avoided by creating a batch renderer.</a:t>
             </a:r>
           </a:p>
         </p:txBody>
       </p:sp>
       <p:pic>
         <p:nvPicPr>
-          <p:cNvPr id="20" name="Picture 19">
-            <a:extLst>
-              <a:ext uri="{FF2B5EF4-FFF2-40B4-BE49-F238E27FC236}">
-                <a16:creationId xmlns:a16="http://schemas.microsoft.com/office/drawing/2014/main" id="{5B375966-556B-4F8D-96AB-BCB5BA9931EF}"/>
+          <p:cNvPr id="14" name="Picture 13">
+            <a:extLst>
+              <a:ext uri="{FF2B5EF4-FFF2-40B4-BE49-F238E27FC236}">
+                <a16:creationId xmlns:a16="http://schemas.microsoft.com/office/drawing/2014/main" id="{9071B4D6-B158-4159-A9B8-68D1E7B96DD3}"/>
               </a:ext>
             </a:extLst>
           </p:cNvPr>
@@ -4872,62 +4865,81 @@
           </p:cNvPicPr>
           <p:nvPr/>
         </p:nvPicPr>
-        <p:blipFill rotWithShape="1">
-          <a:blip r:embed="rId5">
+        <p:blipFill>
+          <a:blip r:embed="rId4">
             <a:extLst>
               <a:ext uri="{28A0092B-C50C-407E-A947-70E740481C1C}">
                 <a14:useLocalDpi xmlns:a14="http://schemas.microsoft.com/office/drawing/2010/main" val="0"/>
               </a:ext>
             </a:extLst>
           </a:blip>
-          <a:srcRect l="55666" t="10771" r="13819" b="62592"/>
-          <a:stretch/>
+          <a:stretch>
+            <a:fillRect/>
+          </a:stretch>
         </p:blipFill>
         <p:spPr>
           <a:xfrm>
-            <a:off x="5825096" y="4460603"/>
-            <a:ext cx="3059280" cy="1455490"/>
+            <a:off x="5943646" y="1563782"/>
+            <a:ext cx="2754952" cy="3206262"/>
           </a:xfrm>
           <a:prstGeom prst="rect">
             <a:avLst/>
           </a:prstGeom>
+          <a:ln>
+            <a:noFill/>
+          </a:ln>
+          <a:effectLst>
+            <a:outerShdw blurRad="292100" dist="139700" dir="2700000" algn="tl" rotWithShape="0">
+              <a:srgbClr val="333333">
+                <a:alpha val="65000"/>
+              </a:srgbClr>
+            </a:outerShdw>
+          </a:effectLst>
         </p:spPr>
       </p:pic>
-      <p:pic>
-        <p:nvPicPr>
-          <p:cNvPr id="22" name="Picture 21">
-            <a:extLst>
-              <a:ext uri="{FF2B5EF4-FFF2-40B4-BE49-F238E27FC236}">
-                <a16:creationId xmlns:a16="http://schemas.microsoft.com/office/drawing/2014/main" id="{07FEF813-6966-4C3A-8881-6C598B7176E9}"/>
-              </a:ext>
-            </a:extLst>
-          </p:cNvPr>
-          <p:cNvPicPr>
-            <a:picLocks noChangeAspect="1"/>
-          </p:cNvPicPr>
+      <p:sp>
+        <p:nvSpPr>
+          <p:cNvPr id="21" name="TextBox 20">
+            <a:extLst>
+              <a:ext uri="{FF2B5EF4-FFF2-40B4-BE49-F238E27FC236}">
+                <a16:creationId xmlns:a16="http://schemas.microsoft.com/office/drawing/2014/main" id="{E3E7B41A-3B99-4635-ABB7-71B5D966319D}"/>
+              </a:ext>
+            </a:extLst>
+          </p:cNvPr>
+          <p:cNvSpPr txBox="1"/>
           <p:nvPr/>
-        </p:nvPicPr>
-        <p:blipFill rotWithShape="1">
-          <a:blip r:embed="rId6">
-            <a:extLst>
-              <a:ext uri="{28A0092B-C50C-407E-A947-70E740481C1C}">
-                <a14:useLocalDpi xmlns:a14="http://schemas.microsoft.com/office/drawing/2010/main" val="0"/>
-              </a:ext>
-            </a:extLst>
-          </a:blip>
-          <a:srcRect l="56044" t="10518" r="14335" b="62214"/>
-          <a:stretch/>
-        </p:blipFill>
-        <p:spPr>
-          <a:xfrm>
-            <a:off x="9044826" y="4418000"/>
-            <a:ext cx="2923555" cy="1466878"/>
+        </p:nvSpPr>
+        <p:spPr>
+          <a:xfrm>
+            <a:off x="8816669" y="1879373"/>
+            <a:ext cx="3199485" cy="707886"/>
           </a:xfrm>
           <a:prstGeom prst="rect">
             <a:avLst/>
           </a:prstGeom>
-        </p:spPr>
-      </p:pic>
+          <a:noFill/>
+        </p:spPr>
+        <p:txBody>
+          <a:bodyPr wrap="square" rtlCol="0">
+            <a:spAutoFit/>
+          </a:bodyPr>
+          <a:lstStyle/>
+          <a:p>
+            <a:r>
+              <a:rPr lang="en-GB" sz="1000" dirty="0"/>
+              <a:t>I also removed the rendering of the trees issue, by removing the two vectors of trees. Instead I used an </a:t>
+            </a:r>
+            <a:r>
+              <a:rPr lang="en-GB" sz="1000" dirty="0" err="1"/>
+              <a:t>enum</a:t>
+            </a:r>
+            <a:r>
+              <a:rPr lang="en-GB" sz="1000" dirty="0"/>
+              <a:t> to store the layer of each sprite, and that decides when the texture will be rendered.</a:t>
+            </a:r>
+          </a:p>
+        </p:txBody>
+      </p:sp>
     </p:spTree>
     <p:extLst>
       <p:ext uri="{BB962C8B-B14F-4D97-AF65-F5344CB8AC3E}">
@@ -4960,10 +4972,10 @@
       </p:grpSpPr>
       <p:sp>
         <p:nvSpPr>
-          <p:cNvPr id="4" name="TextBox 3">
-            <a:extLst>
-              <a:ext uri="{FF2B5EF4-FFF2-40B4-BE49-F238E27FC236}">
-                <a16:creationId xmlns:a16="http://schemas.microsoft.com/office/drawing/2014/main" id="{1059104E-7A27-4F71-9E5B-1DBA09B91A64}"/>
+          <p:cNvPr id="5" name="TextBox 4">
+            <a:extLst>
+              <a:ext uri="{FF2B5EF4-FFF2-40B4-BE49-F238E27FC236}">
+                <a16:creationId xmlns:a16="http://schemas.microsoft.com/office/drawing/2014/main" id="{22F098BC-C7EA-444F-908F-7F4556505029}"/>
               </a:ext>
             </a:extLst>
           </p:cNvPr>
@@ -4972,7 +4984,7 @@
         </p:nvSpPr>
         <p:spPr>
           <a:xfrm>
-            <a:off x="584036" y="436552"/>
+            <a:off x="780607" y="153912"/>
             <a:ext cx="1716712" cy="400110"/>
           </a:xfrm>
           <a:prstGeom prst="rect">
@@ -4988,17 +5000,17 @@
           <a:p>
             <a:r>
               <a:rPr lang="en-GB" sz="2000" dirty="0"/>
-              <a:t>Solve:</a:t>
-            </a:r>
-          </a:p>
-        </p:txBody>
-      </p:sp>
-      <p:sp>
-        <p:nvSpPr>
-          <p:cNvPr id="5" name="TextBox 4">
-            <a:extLst>
-              <a:ext uri="{FF2B5EF4-FFF2-40B4-BE49-F238E27FC236}">
-                <a16:creationId xmlns:a16="http://schemas.microsoft.com/office/drawing/2014/main" id="{22F098BC-C7EA-444F-908F-7F4556505029}"/>
+              <a:t>Check:</a:t>
+            </a:r>
+          </a:p>
+        </p:txBody>
+      </p:sp>
+      <p:sp>
+        <p:nvSpPr>
+          <p:cNvPr id="6" name="TextBox 5">
+            <a:extLst>
+              <a:ext uri="{FF2B5EF4-FFF2-40B4-BE49-F238E27FC236}">
+                <a16:creationId xmlns:a16="http://schemas.microsoft.com/office/drawing/2014/main" id="{1EC74D93-AEB5-43E0-962B-2EFA5812B233}"/>
               </a:ext>
             </a:extLst>
           </p:cNvPr>
@@ -5007,8 +5019,8 @@
         </p:nvSpPr>
         <p:spPr>
           <a:xfrm>
-            <a:off x="9455683" y="388374"/>
-            <a:ext cx="1716712" cy="400110"/>
+            <a:off x="344939" y="950901"/>
+            <a:ext cx="5136642" cy="707886"/>
           </a:xfrm>
           <a:prstGeom prst="rect">
             <a:avLst/>
@@ -5022,8 +5034,157 @@
           <a:lstStyle/>
           <a:p>
             <a:r>
-              <a:rPr lang="en-GB" sz="2000" dirty="0"/>
-              <a:t>Check:</a:t>
+              <a:rPr lang="en-GB" sz="1000" dirty="0"/>
+              <a:t>This means that now the game doesn’t create a new texture for each cell as the player explores the level, which results in a much lower memory footprint.</a:t>
+            </a:r>
+          </a:p>
+          <a:p>
+            <a:endParaRPr lang="en-GB" sz="1000" dirty="0"/>
+          </a:p>
+          <a:p>
+            <a:r>
+              <a:rPr lang="en-GB" sz="1000" dirty="0"/>
+              <a:t>                       NEW			               OLD</a:t>
+            </a:r>
+          </a:p>
+        </p:txBody>
+      </p:sp>
+      <p:pic>
+        <p:nvPicPr>
+          <p:cNvPr id="7" name="Picture 6">
+            <a:extLst>
+              <a:ext uri="{FF2B5EF4-FFF2-40B4-BE49-F238E27FC236}">
+                <a16:creationId xmlns:a16="http://schemas.microsoft.com/office/drawing/2014/main" id="{DC5DC135-04F0-410D-BE6E-04D123227540}"/>
+              </a:ext>
+            </a:extLst>
+          </p:cNvPr>
+          <p:cNvPicPr>
+            <a:picLocks noChangeAspect="1"/>
+          </p:cNvPicPr>
+          <p:nvPr/>
+        </p:nvPicPr>
+        <p:blipFill rotWithShape="1">
+          <a:blip r:embed="rId2">
+            <a:extLst>
+              <a:ext uri="{28A0092B-C50C-407E-A947-70E740481C1C}">
+                <a14:useLocalDpi xmlns:a14="http://schemas.microsoft.com/office/drawing/2010/main" val="0"/>
+              </a:ext>
+            </a:extLst>
+          </a:blip>
+          <a:srcRect l="89999" t="7480" r="770" b="67310"/>
+          <a:stretch/>
+        </p:blipFill>
+        <p:spPr>
+          <a:xfrm>
+            <a:off x="3745648" y="1702815"/>
+            <a:ext cx="1667474" cy="1863997"/>
+          </a:xfrm>
+          <a:prstGeom prst="rect">
+            <a:avLst/>
+          </a:prstGeom>
+        </p:spPr>
+      </p:pic>
+      <p:pic>
+        <p:nvPicPr>
+          <p:cNvPr id="8" name="Picture 7">
+            <a:extLst>
+              <a:ext uri="{FF2B5EF4-FFF2-40B4-BE49-F238E27FC236}">
+                <a16:creationId xmlns:a16="http://schemas.microsoft.com/office/drawing/2014/main" id="{6744F042-B1B1-4A53-95CE-1F86FC17E1CB}"/>
+              </a:ext>
+            </a:extLst>
+          </p:cNvPr>
+          <p:cNvPicPr>
+            <a:picLocks noChangeAspect="1"/>
+          </p:cNvPicPr>
+          <p:nvPr/>
+        </p:nvPicPr>
+        <p:blipFill rotWithShape="1">
+          <a:blip r:embed="rId3">
+            <a:extLst>
+              <a:ext uri="{28A0092B-C50C-407E-A947-70E740481C1C}">
+                <a14:useLocalDpi xmlns:a14="http://schemas.microsoft.com/office/drawing/2010/main" val="0"/>
+              </a:ext>
+            </a:extLst>
+          </a:blip>
+          <a:srcRect l="89952" t="8184" r="962" b="67488"/>
+          <a:stretch/>
+        </p:blipFill>
+        <p:spPr>
+          <a:xfrm>
+            <a:off x="416172" y="1702815"/>
+            <a:ext cx="1770175" cy="1939875"/>
+          </a:xfrm>
+          <a:prstGeom prst="rect">
+            <a:avLst/>
+          </a:prstGeom>
+        </p:spPr>
+      </p:pic>
+      <p:pic>
+        <p:nvPicPr>
+          <p:cNvPr id="10" name="Picture 9">
+            <a:extLst>
+              <a:ext uri="{FF2B5EF4-FFF2-40B4-BE49-F238E27FC236}">
+                <a16:creationId xmlns:a16="http://schemas.microsoft.com/office/drawing/2014/main" id="{7272A163-3BD5-4EE1-9E71-32307A48F860}"/>
+              </a:ext>
+            </a:extLst>
+          </p:cNvPr>
+          <p:cNvPicPr>
+            <a:picLocks noChangeAspect="1"/>
+          </p:cNvPicPr>
+          <p:nvPr/>
+        </p:nvPicPr>
+        <p:blipFill rotWithShape="1">
+          <a:blip r:embed="rId4">
+            <a:extLst>
+              <a:ext uri="{28A0092B-C50C-407E-A947-70E740481C1C}">
+                <a14:useLocalDpi xmlns:a14="http://schemas.microsoft.com/office/drawing/2010/main" val="0"/>
+              </a:ext>
+            </a:extLst>
+          </a:blip>
+          <a:srcRect l="13268" t="5983" r="22103" b="64701"/>
+          <a:stretch/>
+        </p:blipFill>
+        <p:spPr>
+          <a:xfrm>
+            <a:off x="344939" y="4226193"/>
+            <a:ext cx="5445370" cy="2010507"/>
+          </a:xfrm>
+          <a:prstGeom prst="rect">
+            <a:avLst/>
+          </a:prstGeom>
+        </p:spPr>
+      </p:pic>
+      <p:sp>
+        <p:nvSpPr>
+          <p:cNvPr id="11" name="TextBox 10">
+            <a:extLst>
+              <a:ext uri="{FF2B5EF4-FFF2-40B4-BE49-F238E27FC236}">
+                <a16:creationId xmlns:a16="http://schemas.microsoft.com/office/drawing/2014/main" id="{FF957AE1-E446-4BCC-B1B7-5D58C404083D}"/>
+              </a:ext>
+            </a:extLst>
+          </p:cNvPr>
+          <p:cNvSpPr txBox="1"/>
+          <p:nvPr/>
+        </p:nvSpPr>
+        <p:spPr>
+          <a:xfrm>
+            <a:off x="344939" y="3686718"/>
+            <a:ext cx="5136642" cy="553998"/>
+          </a:xfrm>
+          <a:prstGeom prst="rect">
+            <a:avLst/>
+          </a:prstGeom>
+          <a:noFill/>
+        </p:spPr>
+        <p:txBody>
+          <a:bodyPr wrap="square" rtlCol="0">
+            <a:spAutoFit/>
+          </a:bodyPr>
+          <a:lstStyle/>
+          <a:p>
+            <a:r>
+              <a:rPr lang="en-GB" sz="1000" dirty="0"/>
+              <a:t>When comparing the profiler to a previous run, the overall application has a negative delta, which I believe means it ran faster. However this is not a great overall improvement, compared to what I was expecting.</a:t>
             </a:r>
           </a:p>
         </p:txBody>
@@ -5032,6 +5193,679 @@
     <p:extLst>
       <p:ext uri="{BB962C8B-B14F-4D97-AF65-F5344CB8AC3E}">
         <p14:creationId xmlns:p14="http://schemas.microsoft.com/office/powerpoint/2010/main" val="3712968065"/>
+      </p:ext>
+    </p:extLst>
+  </p:cSld>
+  <p:clrMapOvr>
+    <a:masterClrMapping/>
+  </p:clrMapOvr>
+</p:sld>
+</file>
+
+<file path=ppt/slides/slide5.xml><?xml version="1.0" encoding="utf-8"?>
+<p:sld xmlns:a="http://schemas.openxmlformats.org/drawingml/2006/main" xmlns:r="http://schemas.openxmlformats.org/officeDocument/2006/relationships" xmlns:p="http://schemas.openxmlformats.org/presentationml/2006/main">
+  <p:cSld>
+    <p:spTree>
+      <p:nvGrpSpPr>
+        <p:cNvPr id="1" name=""/>
+        <p:cNvGrpSpPr/>
+        <p:nvPr/>
+      </p:nvGrpSpPr>
+      <p:grpSpPr>
+        <a:xfrm>
+          <a:off x="0" y="0"/>
+          <a:ext cx="0" cy="0"/>
+          <a:chOff x="0" y="0"/>
+          <a:chExt cx="0" cy="0"/>
+        </a:xfrm>
+      </p:grpSpPr>
+      <p:sp>
+        <p:nvSpPr>
+          <p:cNvPr id="4" name="TextBox 3">
+            <a:extLst>
+              <a:ext uri="{FF2B5EF4-FFF2-40B4-BE49-F238E27FC236}">
+                <a16:creationId xmlns:a16="http://schemas.microsoft.com/office/drawing/2014/main" id="{2C6788AA-5E61-42FF-9466-F88F6225F585}"/>
+              </a:ext>
+            </a:extLst>
+          </p:cNvPr>
+          <p:cNvSpPr txBox="1"/>
+          <p:nvPr/>
+        </p:nvSpPr>
+        <p:spPr>
+          <a:xfrm>
+            <a:off x="584036" y="436552"/>
+            <a:ext cx="1716712" cy="400110"/>
+          </a:xfrm>
+          <a:prstGeom prst="rect">
+            <a:avLst/>
+          </a:prstGeom>
+          <a:noFill/>
+        </p:spPr>
+        <p:txBody>
+          <a:bodyPr wrap="square" rtlCol="0">
+            <a:spAutoFit/>
+          </a:bodyPr>
+          <a:lstStyle/>
+          <a:p>
+            <a:r>
+              <a:rPr lang="en-GB" sz="2000" dirty="0"/>
+              <a:t>Benchmark:</a:t>
+            </a:r>
+          </a:p>
+        </p:txBody>
+      </p:sp>
+      <p:sp>
+        <p:nvSpPr>
+          <p:cNvPr id="5" name="TextBox 4">
+            <a:extLst>
+              <a:ext uri="{FF2B5EF4-FFF2-40B4-BE49-F238E27FC236}">
+                <a16:creationId xmlns:a16="http://schemas.microsoft.com/office/drawing/2014/main" id="{26A02C46-A364-41FB-8F9B-8985128D9E3C}"/>
+              </a:ext>
+            </a:extLst>
+          </p:cNvPr>
+          <p:cNvSpPr txBox="1"/>
+          <p:nvPr/>
+        </p:nvSpPr>
+        <p:spPr>
+          <a:xfrm>
+            <a:off x="6311327" y="414001"/>
+            <a:ext cx="1716712" cy="400110"/>
+          </a:xfrm>
+          <a:prstGeom prst="rect">
+            <a:avLst/>
+          </a:prstGeom>
+          <a:noFill/>
+        </p:spPr>
+        <p:txBody>
+          <a:bodyPr wrap="square" rtlCol="0">
+            <a:spAutoFit/>
+          </a:bodyPr>
+          <a:lstStyle/>
+          <a:p>
+            <a:r>
+              <a:rPr lang="en-GB" sz="2000" dirty="0"/>
+              <a:t>Measure:</a:t>
+            </a:r>
+          </a:p>
+        </p:txBody>
+      </p:sp>
+      <p:sp>
+        <p:nvSpPr>
+          <p:cNvPr id="6" name="TextBox 5">
+            <a:extLst>
+              <a:ext uri="{FF2B5EF4-FFF2-40B4-BE49-F238E27FC236}">
+                <a16:creationId xmlns:a16="http://schemas.microsoft.com/office/drawing/2014/main" id="{4AAC7291-E62F-4982-9B51-D5EC3DB4B686}"/>
+              </a:ext>
+            </a:extLst>
+          </p:cNvPr>
+          <p:cNvSpPr txBox="1"/>
+          <p:nvPr/>
+        </p:nvSpPr>
+        <p:spPr>
+          <a:xfrm>
+            <a:off x="5821383" y="836662"/>
+            <a:ext cx="5433307" cy="553998"/>
+          </a:xfrm>
+          <a:prstGeom prst="rect">
+            <a:avLst/>
+          </a:prstGeom>
+          <a:noFill/>
+        </p:spPr>
+        <p:txBody>
+          <a:bodyPr wrap="square" rtlCol="0">
+            <a:spAutoFit/>
+          </a:bodyPr>
+          <a:lstStyle/>
+          <a:p>
+            <a:r>
+              <a:rPr lang="en-GB" sz="1000" dirty="0" err="1"/>
+              <a:t>RenderObjects</a:t>
+            </a:r>
+            <a:r>
+              <a:rPr lang="en-GB" sz="1000" dirty="0"/>
+              <a:t> is still using roughly 35% of the processes CPU usage, even though the total CPU usage of the game is very low still, it’ll be worth going into depth to try and optimise </a:t>
+            </a:r>
+            <a:r>
+              <a:rPr lang="en-GB" sz="1000" dirty="0" err="1"/>
+              <a:t>RenderObjects</a:t>
+            </a:r>
+            <a:r>
+              <a:rPr lang="en-GB" sz="1000" dirty="0"/>
+              <a:t> further, as this is the main cause of the slow performance at the moment.</a:t>
+            </a:r>
+          </a:p>
+        </p:txBody>
+      </p:sp>
+      <p:sp>
+        <p:nvSpPr>
+          <p:cNvPr id="7" name="TextBox 6">
+            <a:extLst>
+              <a:ext uri="{FF2B5EF4-FFF2-40B4-BE49-F238E27FC236}">
+                <a16:creationId xmlns:a16="http://schemas.microsoft.com/office/drawing/2014/main" id="{A646A902-A43B-438E-AC13-0CDB15DC0BE0}"/>
+              </a:ext>
+            </a:extLst>
+          </p:cNvPr>
+          <p:cNvSpPr txBox="1"/>
+          <p:nvPr/>
+        </p:nvSpPr>
+        <p:spPr>
+          <a:xfrm>
+            <a:off x="584036" y="924959"/>
+            <a:ext cx="4843372" cy="400110"/>
+          </a:xfrm>
+          <a:prstGeom prst="rect">
+            <a:avLst/>
+          </a:prstGeom>
+          <a:noFill/>
+        </p:spPr>
+        <p:txBody>
+          <a:bodyPr wrap="square" rtlCol="0">
+            <a:spAutoFit/>
+          </a:bodyPr>
+          <a:lstStyle/>
+          <a:p>
+            <a:r>
+              <a:rPr lang="en-GB" sz="1000" dirty="0"/>
+              <a:t>When I ran the test again I still found that render objects is sill using a considerable amount of CPU utilisation.</a:t>
+            </a:r>
+          </a:p>
+        </p:txBody>
+      </p:sp>
+      <p:pic>
+        <p:nvPicPr>
+          <p:cNvPr id="9" name="Picture 8">
+            <a:extLst>
+              <a:ext uri="{FF2B5EF4-FFF2-40B4-BE49-F238E27FC236}">
+                <a16:creationId xmlns:a16="http://schemas.microsoft.com/office/drawing/2014/main" id="{4F3BB4B1-DBA1-4879-8605-F8110818B1F3}"/>
+              </a:ext>
+            </a:extLst>
+          </p:cNvPr>
+          <p:cNvPicPr>
+            <a:picLocks noChangeAspect="1"/>
+          </p:cNvPicPr>
+          <p:nvPr/>
+        </p:nvPicPr>
+        <p:blipFill rotWithShape="1">
+          <a:blip r:embed="rId2">
+            <a:extLst>
+              <a:ext uri="{28A0092B-C50C-407E-A947-70E740481C1C}">
+                <a14:useLocalDpi xmlns:a14="http://schemas.microsoft.com/office/drawing/2010/main" val="0"/>
+              </a:ext>
+            </a:extLst>
+          </a:blip>
+          <a:srcRect l="13480" t="5709" r="22033" b="56923"/>
+          <a:stretch/>
+        </p:blipFill>
+        <p:spPr>
+          <a:xfrm>
+            <a:off x="492708" y="1598927"/>
+            <a:ext cx="4588272" cy="2164181"/>
+          </a:xfrm>
+          <a:prstGeom prst="rect">
+            <a:avLst/>
+          </a:prstGeom>
+        </p:spPr>
+      </p:pic>
+      <p:pic>
+        <p:nvPicPr>
+          <p:cNvPr id="11" name="Picture 10">
+            <a:extLst>
+              <a:ext uri="{FF2B5EF4-FFF2-40B4-BE49-F238E27FC236}">
+                <a16:creationId xmlns:a16="http://schemas.microsoft.com/office/drawing/2014/main" id="{BD2DA7D1-E76E-4D89-8B93-DB47BF6F7543}"/>
+              </a:ext>
+            </a:extLst>
+          </p:cNvPr>
+          <p:cNvPicPr>
+            <a:picLocks noChangeAspect="1"/>
+          </p:cNvPicPr>
+          <p:nvPr/>
+        </p:nvPicPr>
+        <p:blipFill>
+          <a:blip r:embed="rId3">
+            <a:extLst>
+              <a:ext uri="{28A0092B-C50C-407E-A947-70E740481C1C}">
+                <a14:useLocalDpi xmlns:a14="http://schemas.microsoft.com/office/drawing/2010/main" val="0"/>
+              </a:ext>
+            </a:extLst>
+          </a:blip>
+          <a:stretch>
+            <a:fillRect/>
+          </a:stretch>
+        </p:blipFill>
+        <p:spPr>
+          <a:xfrm>
+            <a:off x="10220413" y="1390660"/>
+            <a:ext cx="1641791" cy="3946613"/>
+          </a:xfrm>
+          <a:prstGeom prst="rect">
+            <a:avLst/>
+          </a:prstGeom>
+        </p:spPr>
+      </p:pic>
+      <p:pic>
+        <p:nvPicPr>
+          <p:cNvPr id="13" name="Picture 12">
+            <a:extLst>
+              <a:ext uri="{FF2B5EF4-FFF2-40B4-BE49-F238E27FC236}">
+                <a16:creationId xmlns:a16="http://schemas.microsoft.com/office/drawing/2014/main" id="{B8270C25-B2FD-44EE-AC77-65C44D3328D6}"/>
+              </a:ext>
+            </a:extLst>
+          </p:cNvPr>
+          <p:cNvPicPr>
+            <a:picLocks noChangeAspect="1"/>
+          </p:cNvPicPr>
+          <p:nvPr/>
+        </p:nvPicPr>
+        <p:blipFill>
+          <a:blip r:embed="rId4">
+            <a:extLst>
+              <a:ext uri="{28A0092B-C50C-407E-A947-70E740481C1C}">
+                <a14:useLocalDpi xmlns:a14="http://schemas.microsoft.com/office/drawing/2010/main" val="0"/>
+              </a:ext>
+            </a:extLst>
+          </a:blip>
+          <a:stretch>
+            <a:fillRect/>
+          </a:stretch>
+        </p:blipFill>
+        <p:spPr>
+          <a:xfrm>
+            <a:off x="5914274" y="1598927"/>
+            <a:ext cx="4306592" cy="1988335"/>
+          </a:xfrm>
+          <a:prstGeom prst="rect">
+            <a:avLst/>
+          </a:prstGeom>
+        </p:spPr>
+      </p:pic>
+      <p:sp>
+        <p:nvSpPr>
+          <p:cNvPr id="14" name="TextBox 13">
+            <a:extLst>
+              <a:ext uri="{FF2B5EF4-FFF2-40B4-BE49-F238E27FC236}">
+                <a16:creationId xmlns:a16="http://schemas.microsoft.com/office/drawing/2014/main" id="{A3F37B26-499D-4387-A441-5895FFC3F408}"/>
+              </a:ext>
+            </a:extLst>
+          </p:cNvPr>
+          <p:cNvSpPr txBox="1"/>
+          <p:nvPr/>
+        </p:nvSpPr>
+        <p:spPr>
+          <a:xfrm>
+            <a:off x="5821383" y="3795529"/>
+            <a:ext cx="4195986" cy="246221"/>
+          </a:xfrm>
+          <a:prstGeom prst="rect">
+            <a:avLst/>
+          </a:prstGeom>
+          <a:noFill/>
+        </p:spPr>
+        <p:txBody>
+          <a:bodyPr wrap="square" rtlCol="0">
+            <a:spAutoFit/>
+          </a:bodyPr>
+          <a:lstStyle/>
+          <a:p>
+            <a:r>
+              <a:rPr lang="en-GB" sz="1000" dirty="0"/>
+              <a:t>The frame rate in debug is still not optimal, only getting about 20 FPS. </a:t>
+            </a:r>
+          </a:p>
+        </p:txBody>
+      </p:sp>
+      <p:cxnSp>
+        <p:nvCxnSpPr>
+          <p:cNvPr id="15" name="Straight Connector 14">
+            <a:extLst>
+              <a:ext uri="{FF2B5EF4-FFF2-40B4-BE49-F238E27FC236}">
+                <a16:creationId xmlns:a16="http://schemas.microsoft.com/office/drawing/2014/main" id="{F4DDFD08-78FF-49D9-BC0B-8995E634381B}"/>
+              </a:ext>
+            </a:extLst>
+          </p:cNvPr>
+          <p:cNvCxnSpPr/>
+          <p:nvPr/>
+        </p:nvCxnSpPr>
+        <p:spPr>
+          <a:xfrm>
+            <a:off x="5759042" y="176169"/>
+            <a:ext cx="0" cy="6610525"/>
+          </a:xfrm>
+          <a:prstGeom prst="line">
+            <a:avLst/>
+          </a:prstGeom>
+        </p:spPr>
+        <p:style>
+          <a:lnRef idx="1">
+            <a:schemeClr val="accent1"/>
+          </a:lnRef>
+          <a:fillRef idx="0">
+            <a:schemeClr val="accent1"/>
+          </a:fillRef>
+          <a:effectRef idx="0">
+            <a:schemeClr val="accent1"/>
+          </a:effectRef>
+          <a:fontRef idx="minor">
+            <a:schemeClr val="tx1"/>
+          </a:fontRef>
+        </p:style>
+      </p:cxnSp>
+    </p:spTree>
+    <p:extLst>
+      <p:ext uri="{BB962C8B-B14F-4D97-AF65-F5344CB8AC3E}">
+        <p14:creationId xmlns:p14="http://schemas.microsoft.com/office/powerpoint/2010/main" val="2227509953"/>
+      </p:ext>
+    </p:extLst>
+  </p:cSld>
+  <p:clrMapOvr>
+    <a:masterClrMapping/>
+  </p:clrMapOvr>
+</p:sld>
+</file>
+
+<file path=ppt/slides/slide6.xml><?xml version="1.0" encoding="utf-8"?>
+<p:sld xmlns:a="http://schemas.openxmlformats.org/drawingml/2006/main" xmlns:r="http://schemas.openxmlformats.org/officeDocument/2006/relationships" xmlns:p="http://schemas.openxmlformats.org/presentationml/2006/main">
+  <p:cSld>
+    <p:spTree>
+      <p:nvGrpSpPr>
+        <p:cNvPr id="1" name=""/>
+        <p:cNvGrpSpPr/>
+        <p:nvPr/>
+      </p:nvGrpSpPr>
+      <p:grpSpPr>
+        <a:xfrm>
+          <a:off x="0" y="0"/>
+          <a:ext cx="0" cy="0"/>
+          <a:chOff x="0" y="0"/>
+          <a:chExt cx="0" cy="0"/>
+        </a:xfrm>
+      </p:grpSpPr>
+      <p:sp>
+        <p:nvSpPr>
+          <p:cNvPr id="4" name="TextBox 3">
+            <a:extLst>
+              <a:ext uri="{FF2B5EF4-FFF2-40B4-BE49-F238E27FC236}">
+                <a16:creationId xmlns:a16="http://schemas.microsoft.com/office/drawing/2014/main" id="{D523420B-835F-4EB7-AC31-8B3A41D93C87}"/>
+              </a:ext>
+            </a:extLst>
+          </p:cNvPr>
+          <p:cNvSpPr txBox="1"/>
+          <p:nvPr/>
+        </p:nvSpPr>
+        <p:spPr>
+          <a:xfrm>
+            <a:off x="270387" y="230075"/>
+            <a:ext cx="1716712" cy="400110"/>
+          </a:xfrm>
+          <a:prstGeom prst="rect">
+            <a:avLst/>
+          </a:prstGeom>
+          <a:noFill/>
+        </p:spPr>
+        <p:txBody>
+          <a:bodyPr wrap="square" rtlCol="0">
+            <a:spAutoFit/>
+          </a:bodyPr>
+          <a:lstStyle/>
+          <a:p>
+            <a:r>
+              <a:rPr lang="en-GB" sz="2000" dirty="0"/>
+              <a:t>Detect:</a:t>
+            </a:r>
+          </a:p>
+        </p:txBody>
+      </p:sp>
+      <p:sp>
+        <p:nvSpPr>
+          <p:cNvPr id="5" name="TextBox 4">
+            <a:extLst>
+              <a:ext uri="{FF2B5EF4-FFF2-40B4-BE49-F238E27FC236}">
+                <a16:creationId xmlns:a16="http://schemas.microsoft.com/office/drawing/2014/main" id="{BCB62EB6-F928-4979-A362-3143A94CF575}"/>
+              </a:ext>
+            </a:extLst>
+          </p:cNvPr>
+          <p:cNvSpPr txBox="1"/>
+          <p:nvPr/>
+        </p:nvSpPr>
+        <p:spPr>
+          <a:xfrm>
+            <a:off x="7840242" y="230075"/>
+            <a:ext cx="1716712" cy="400110"/>
+          </a:xfrm>
+          <a:prstGeom prst="rect">
+            <a:avLst/>
+          </a:prstGeom>
+          <a:noFill/>
+        </p:spPr>
+        <p:txBody>
+          <a:bodyPr wrap="square" rtlCol="0">
+            <a:spAutoFit/>
+          </a:bodyPr>
+          <a:lstStyle/>
+          <a:p>
+            <a:r>
+              <a:rPr lang="en-GB" sz="2000" dirty="0"/>
+              <a:t>Solve:</a:t>
+            </a:r>
+          </a:p>
+        </p:txBody>
+      </p:sp>
+      <p:sp>
+        <p:nvSpPr>
+          <p:cNvPr id="6" name="TextBox 5">
+            <a:extLst>
+              <a:ext uri="{FF2B5EF4-FFF2-40B4-BE49-F238E27FC236}">
+                <a16:creationId xmlns:a16="http://schemas.microsoft.com/office/drawing/2014/main" id="{53266E8E-0391-4B89-A306-17331AEF47F1}"/>
+              </a:ext>
+            </a:extLst>
+          </p:cNvPr>
+          <p:cNvSpPr txBox="1"/>
+          <p:nvPr/>
+        </p:nvSpPr>
+        <p:spPr>
+          <a:xfrm>
+            <a:off x="193263" y="831998"/>
+            <a:ext cx="3440892" cy="707886"/>
+          </a:xfrm>
+          <a:prstGeom prst="rect">
+            <a:avLst/>
+          </a:prstGeom>
+          <a:noFill/>
+        </p:spPr>
+        <p:txBody>
+          <a:bodyPr wrap="square" rtlCol="0">
+            <a:spAutoFit/>
+          </a:bodyPr>
+          <a:lstStyle/>
+          <a:p>
+            <a:r>
+              <a:rPr lang="en-GB" sz="1000" dirty="0"/>
+              <a:t>The main cause of the lag is this small bit of code below, which renders the chunks that are around the camera position. I remember writing this code very late at night so I will go over it and see if there is any areas that can be optimised.</a:t>
+            </a:r>
+          </a:p>
+        </p:txBody>
+      </p:sp>
+      <p:sp>
+        <p:nvSpPr>
+          <p:cNvPr id="7" name="TextBox 6">
+            <a:extLst>
+              <a:ext uri="{FF2B5EF4-FFF2-40B4-BE49-F238E27FC236}">
+                <a16:creationId xmlns:a16="http://schemas.microsoft.com/office/drawing/2014/main" id="{98AA5085-7AA5-4C35-A823-6B07A7D3FCC9}"/>
+              </a:ext>
+            </a:extLst>
+          </p:cNvPr>
+          <p:cNvSpPr txBox="1"/>
+          <p:nvPr/>
+        </p:nvSpPr>
+        <p:spPr>
+          <a:xfrm>
+            <a:off x="193262" y="2901461"/>
+            <a:ext cx="4781239" cy="400110"/>
+          </a:xfrm>
+          <a:prstGeom prst="rect">
+            <a:avLst/>
+          </a:prstGeom>
+          <a:noFill/>
+        </p:spPr>
+        <p:txBody>
+          <a:bodyPr wrap="square" rtlCol="0">
+            <a:spAutoFit/>
+          </a:bodyPr>
+          <a:lstStyle/>
+          <a:p>
+            <a:r>
+              <a:rPr lang="en-GB" sz="1000" dirty="0"/>
+              <a:t>After playing round with the chunk rendering code, I found that it was actually rendering a lot more cells off screen, that I will be able to cull.</a:t>
+            </a:r>
+          </a:p>
+        </p:txBody>
+      </p:sp>
+      <p:pic>
+        <p:nvPicPr>
+          <p:cNvPr id="9" name="Picture 8">
+            <a:extLst>
+              <a:ext uri="{FF2B5EF4-FFF2-40B4-BE49-F238E27FC236}">
+                <a16:creationId xmlns:a16="http://schemas.microsoft.com/office/drawing/2014/main" id="{572EEAB9-1812-4D7B-9561-15E0CD01A97C}"/>
+              </a:ext>
+            </a:extLst>
+          </p:cNvPr>
+          <p:cNvPicPr>
+            <a:picLocks noChangeAspect="1"/>
+          </p:cNvPicPr>
+          <p:nvPr/>
+        </p:nvPicPr>
+        <p:blipFill>
+          <a:blip r:embed="rId2">
+            <a:extLst>
+              <a:ext uri="{28A0092B-C50C-407E-A947-70E740481C1C}">
+                <a14:useLocalDpi xmlns:a14="http://schemas.microsoft.com/office/drawing/2010/main" val="0"/>
+              </a:ext>
+            </a:extLst>
+          </a:blip>
+          <a:stretch>
+            <a:fillRect/>
+          </a:stretch>
+        </p:blipFill>
+        <p:spPr>
+          <a:xfrm>
+            <a:off x="193262" y="1483749"/>
+            <a:ext cx="5404425" cy="1300482"/>
+          </a:xfrm>
+          <a:prstGeom prst="rect">
+            <a:avLst/>
+          </a:prstGeom>
+        </p:spPr>
+      </p:pic>
+      <p:cxnSp>
+        <p:nvCxnSpPr>
+          <p:cNvPr id="10" name="Straight Connector 9">
+            <a:extLst>
+              <a:ext uri="{FF2B5EF4-FFF2-40B4-BE49-F238E27FC236}">
+                <a16:creationId xmlns:a16="http://schemas.microsoft.com/office/drawing/2014/main" id="{72F5FC46-5D72-4F77-A23D-B677F99693A2}"/>
+              </a:ext>
+            </a:extLst>
+          </p:cNvPr>
+          <p:cNvCxnSpPr/>
+          <p:nvPr/>
+        </p:nvCxnSpPr>
+        <p:spPr>
+          <a:xfrm>
+            <a:off x="5759042" y="176169"/>
+            <a:ext cx="0" cy="6610525"/>
+          </a:xfrm>
+          <a:prstGeom prst="line">
+            <a:avLst/>
+          </a:prstGeom>
+        </p:spPr>
+        <p:style>
+          <a:lnRef idx="1">
+            <a:schemeClr val="accent1"/>
+          </a:lnRef>
+          <a:fillRef idx="0">
+            <a:schemeClr val="accent1"/>
+          </a:fillRef>
+          <a:effectRef idx="0">
+            <a:schemeClr val="accent1"/>
+          </a:effectRef>
+          <a:fontRef idx="minor">
+            <a:schemeClr val="tx1"/>
+          </a:fontRef>
+        </p:style>
+      </p:cxnSp>
+      <p:pic>
+        <p:nvPicPr>
+          <p:cNvPr id="12" name="Picture 11">
+            <a:extLst>
+              <a:ext uri="{FF2B5EF4-FFF2-40B4-BE49-F238E27FC236}">
+                <a16:creationId xmlns:a16="http://schemas.microsoft.com/office/drawing/2014/main" id="{06351F89-D68B-4188-9863-DFE09DD3F339}"/>
+              </a:ext>
+            </a:extLst>
+          </p:cNvPr>
+          <p:cNvPicPr>
+            <a:picLocks noChangeAspect="1"/>
+          </p:cNvPicPr>
+          <p:nvPr/>
+        </p:nvPicPr>
+        <p:blipFill>
+          <a:blip r:embed="rId3">
+            <a:extLst>
+              <a:ext uri="{28A0092B-C50C-407E-A947-70E740481C1C}">
+                <a14:useLocalDpi xmlns:a14="http://schemas.microsoft.com/office/drawing/2010/main" val="0"/>
+              </a:ext>
+            </a:extLst>
+          </a:blip>
+          <a:stretch>
+            <a:fillRect/>
+          </a:stretch>
+        </p:blipFill>
+        <p:spPr>
+          <a:xfrm>
+            <a:off x="252676" y="3418801"/>
+            <a:ext cx="4058302" cy="1888353"/>
+          </a:xfrm>
+          <a:prstGeom prst="rect">
+            <a:avLst/>
+          </a:prstGeom>
+        </p:spPr>
+      </p:pic>
+      <p:sp>
+        <p:nvSpPr>
+          <p:cNvPr id="13" name="TextBox 12">
+            <a:extLst>
+              <a:ext uri="{FF2B5EF4-FFF2-40B4-BE49-F238E27FC236}">
+                <a16:creationId xmlns:a16="http://schemas.microsoft.com/office/drawing/2014/main" id="{DC4FCCCE-3F18-47B2-8570-F35A225676B4}"/>
+              </a:ext>
+            </a:extLst>
+          </p:cNvPr>
+          <p:cNvSpPr txBox="1"/>
+          <p:nvPr/>
+        </p:nvSpPr>
+        <p:spPr>
+          <a:xfrm>
+            <a:off x="186822" y="5419643"/>
+            <a:ext cx="4781239" cy="400110"/>
+          </a:xfrm>
+          <a:prstGeom prst="rect">
+            <a:avLst/>
+          </a:prstGeom>
+          <a:noFill/>
+        </p:spPr>
+        <p:txBody>
+          <a:bodyPr wrap="square" rtlCol="0">
+            <a:spAutoFit/>
+          </a:bodyPr>
+          <a:lstStyle/>
+          <a:p>
+            <a:r>
+              <a:rPr lang="en-GB" sz="1000" dirty="0"/>
+              <a:t>All I did was removed 1 from the x and y chunks that were being rendered, and this instantly gave an extra 10 frames per second.</a:t>
+            </a:r>
+          </a:p>
+        </p:txBody>
+      </p:sp>
+    </p:spTree>
+    <p:extLst>
+      <p:ext uri="{BB962C8B-B14F-4D97-AF65-F5344CB8AC3E}">
+        <p14:creationId xmlns:p14="http://schemas.microsoft.com/office/powerpoint/2010/main" val="3052582972"/>
       </p:ext>
     </p:extLst>
   </p:cSld>

</xml_diff>

<commit_message>
Started adding timeout for inventory
</commit_message>
<xml_diff>
--- a/OptmisationProcess.pptx
+++ b/OptmisationProcess.pptx
@@ -6339,6 +6339,77 @@
           </a:p>
         </p:txBody>
       </p:sp>
+      <p:pic>
+        <p:nvPicPr>
+          <p:cNvPr id="7" name="Picture 6">
+            <a:extLst>
+              <a:ext uri="{FF2B5EF4-FFF2-40B4-BE49-F238E27FC236}">
+                <a16:creationId xmlns:a16="http://schemas.microsoft.com/office/drawing/2014/main" id="{C71282BA-B1A0-4448-91AC-DF42199FDDBE}"/>
+              </a:ext>
+            </a:extLst>
+          </p:cNvPr>
+          <p:cNvPicPr>
+            <a:picLocks noChangeAspect="1"/>
+          </p:cNvPicPr>
+          <p:nvPr/>
+        </p:nvPicPr>
+        <p:blipFill rotWithShape="1">
+          <a:blip r:embed="rId2">
+            <a:extLst>
+              <a:ext uri="{28A0092B-C50C-407E-A947-70E740481C1C}">
+                <a14:useLocalDpi xmlns:a14="http://schemas.microsoft.com/office/drawing/2010/main" val="0"/>
+              </a:ext>
+            </a:extLst>
+          </a:blip>
+          <a:srcRect l="15445" t="7638" r="25393" b="22778"/>
+          <a:stretch/>
+        </p:blipFill>
+        <p:spPr>
+          <a:xfrm>
+            <a:off x="180974" y="836662"/>
+            <a:ext cx="5012069" cy="5411738"/>
+          </a:xfrm>
+          <a:prstGeom prst="rect">
+            <a:avLst/>
+          </a:prstGeom>
+        </p:spPr>
+      </p:pic>
+      <p:pic>
+        <p:nvPicPr>
+          <p:cNvPr id="9" name="Picture 8">
+            <a:extLst>
+              <a:ext uri="{FF2B5EF4-FFF2-40B4-BE49-F238E27FC236}">
+                <a16:creationId xmlns:a16="http://schemas.microsoft.com/office/drawing/2014/main" id="{C3684998-12E9-4200-BE48-799BAB69F9F1}"/>
+              </a:ext>
+            </a:extLst>
+          </p:cNvPr>
+          <p:cNvPicPr>
+            <a:picLocks noChangeAspect="1"/>
+          </p:cNvPicPr>
+          <p:nvPr/>
+        </p:nvPicPr>
+        <p:blipFill>
+          <a:blip r:embed="rId3">
+            <a:extLst>
+              <a:ext uri="{28A0092B-C50C-407E-A947-70E740481C1C}">
+                <a14:useLocalDpi xmlns:a14="http://schemas.microsoft.com/office/drawing/2010/main" val="0"/>
+              </a:ext>
+            </a:extLst>
+          </a:blip>
+          <a:stretch>
+            <a:fillRect/>
+          </a:stretch>
+        </p:blipFill>
+        <p:spPr>
+          <a:xfrm>
+            <a:off x="7169683" y="1547918"/>
+            <a:ext cx="4307478" cy="1881082"/>
+          </a:xfrm>
+          <a:prstGeom prst="rect">
+            <a:avLst/>
+          </a:prstGeom>
+        </p:spPr>
+      </p:pic>
     </p:spTree>
     <p:extLst>
       <p:ext uri="{BB962C8B-B14F-4D97-AF65-F5344CB8AC3E}">

</xml_diff>